<commit_message>
fixing title author lecture 1
</commit_message>
<xml_diff>
--- a/docs/lectures/lecture_01/01_1_lecture_powerpoint.pptx
+++ b/docs/lectures/lecture_01/01_1_lecture_powerpoint.pptx
@@ -17,7 +17,6 @@
     <p:sldId id="265" r:id="rId11"/>
     <p:sldId id="266" r:id="rId12"/>
     <p:sldId id="267" r:id="rId13"/>
-    <p:sldId id="268" r:id="rId14"/>
   </p:sldIdLst>
   <p:sldSz cx="9144000" cy="5143500" type="screen16x9"/>
   <p:notesSz cx="6858000" cy="9144000"/>
@@ -3287,13 +3286,13 @@
             <a:spLocks noGrp="1"/>
           </p:cNvSpPr>
           <p:nvPr>
-            <p:ph type="ctrTitle"/>
+            <p:ph type="title"/>
           </p:nvPr>
         </p:nvSpPr>
         <p:spPr>
           <a:xfrm>
-            <a:off x="0" y="1"/>
-            <a:ext cx="9144000" cy="565688"/>
+            <a:off x="0" y="0"/>
+            <a:ext cx="9144000" cy="582780"/>
           </a:xfrm>
         </p:spPr>
         <p:txBody>
@@ -3304,40 +3303,31 @@
               <a:buNone/>
             </a:pPr>
             <a:r>
-              <a:rPr/>
-              <a:t>Lecture 01</a:t>
-            </a:r>
-          </a:p>
-        </p:txBody>
-      </p:sp>
-      <p:sp>
-        <p:nvSpPr>
-          <p:cNvPr id="3" name="Subtitle 2"/>
-          <p:cNvSpPr>
-            <a:spLocks noGrp="1"/>
-          </p:cNvSpPr>
-          <p:nvPr>
-            <p:ph idx="1" type="subTitle"/>
-          </p:nvPr>
-        </p:nvSpPr>
-        <p:spPr>
-          <a:xfrm>
-            <a:off x="255722" y="565689"/>
-            <a:ext cx="6400800" cy="1314450"/>
-          </a:xfrm>
-        </p:spPr>
-        <p:txBody>
-          <a:bodyPr/>
-          <a:lstStyle/>
-          <a:p>
-            <a:pPr lvl="0" indent="0" marL="0">
-              <a:buNone/>
-            </a:pPr>
-            <a:br/>
-            <a:br/>
-            <a:r>
-              <a:rPr/>
-              <a:t>Bill Perry</a:t>
+              <a:rPr b="1"/>
+              <a:t>Lecture 1: Syllabus</a:t>
+            </a:r>
+          </a:p>
+        </p:txBody>
+      </p:sp>
+      <p:sp>
+        <p:nvSpPr>
+          <p:cNvPr id="3" name="Content Placeholder 2"/>
+          <p:cNvSpPr>
+            <a:spLocks noGrp="1"/>
+          </p:cNvSpPr>
+          <p:nvPr>
+            <p:ph idx="1"/>
+          </p:nvPr>
+        </p:nvSpPr>
+        <p:spPr/>
+        <p:txBody>
+          <a:bodyPr/>
+          <a:lstStyle/>
+          <a:p>
+            <a:pPr lvl="0"/>
+            <a:r>
+              <a:rPr/>
+              <a:t>Please look over the syllabus as it has all the details of the class and how it will run.</a:t>
             </a:r>
           </a:p>
         </p:txBody>
@@ -3348,123 +3338,6 @@
 </file>
 
 <file path=ppt/slides/slide10.xml><?xml version="1.0" encoding="utf-8"?>
-<p:sld xmlns:a="http://schemas.openxmlformats.org/drawingml/2006/main" xmlns:r="http://schemas.openxmlformats.org/officeDocument/2006/relationships" xmlns:p="http://schemas.openxmlformats.org/presentationml/2006/main">
-  <p:cSld>
-    <p:spTree>
-      <p:nvGrpSpPr>
-        <p:cNvPr id="1" name=""/>
-        <p:cNvGrpSpPr/>
-        <p:nvPr/>
-      </p:nvGrpSpPr>
-      <p:grpSpPr>
-        <a:xfrm>
-          <a:off x="0" y="0"/>
-          <a:ext cx="0" cy="0"/>
-          <a:chOff x="0" y="0"/>
-          <a:chExt cx="0" cy="0"/>
-        </a:xfrm>
-      </p:grpSpPr>
-      <p:sp>
-        <p:nvSpPr>
-          <p:cNvPr id="2" name="Title 1"/>
-          <p:cNvSpPr>
-            <a:spLocks noGrp="1"/>
-          </p:cNvSpPr>
-          <p:nvPr>
-            <p:ph type="title"/>
-          </p:nvPr>
-        </p:nvSpPr>
-        <p:spPr>
-          <a:xfrm>
-            <a:off x="0" y="0"/>
-            <a:ext cx="9144000" cy="602780"/>
-          </a:xfrm>
-          <a:solidFill>
-            <a:srgbClr val="70121D"/>
-          </a:solidFill>
-        </p:spPr>
-        <p:txBody>
-          <a:bodyPr/>
-          <a:lstStyle/>
-          <a:p>
-            <a:pPr lvl="0" indent="0" marL="0">
-              <a:buNone/>
-            </a:pPr>
-            <a:r>
-              <a:rPr b="1"/>
-              <a:t>Lecture 1:</a:t>
-            </a:r>
-            <a:r>
-              <a:rPr/>
-              <a:t> Inductive vs deductive reasoning</a:t>
-            </a:r>
-          </a:p>
-        </p:txBody>
-      </p:sp>
-      <p:sp>
-        <p:nvSpPr>
-          <p:cNvPr id="3" name="Content Placeholder 2"/>
-          <p:cNvSpPr>
-            <a:spLocks noGrp="1"/>
-          </p:cNvSpPr>
-          <p:nvPr>
-            <p:ph idx="1" sz="half"/>
-          </p:nvPr>
-        </p:nvSpPr>
-        <p:spPr/>
-        <p:txBody>
-          <a:bodyPr/>
-          <a:lstStyle/>
-          <a:p>
-            <a:pPr lvl="0" indent="0" marL="0">
-              <a:spcBef>
-                <a:spcPts val="3000"/>
-              </a:spcBef>
-              <a:buNone/>
-            </a:pPr>
-            <a:r>
-              <a:rPr b="1"/>
-              <a:t>In reality we are doing both of these processes</a:t>
-            </a:r>
-          </a:p>
-        </p:txBody>
-      </p:sp>
-      <p:pic>
-        <p:nvPicPr>
-          <p:cNvPr descr="images/deductive_phase.png" id="0" name="Picture 1"/>
-          <p:cNvPicPr>
-            <a:picLocks noGrp="1" noChangeAspect="1"/>
-          </p:cNvPicPr>
-          <p:nvPr/>
-        </p:nvPicPr>
-        <p:blipFill>
-          <a:blip r:embed="rId2"/>
-          <a:stretch>
-            <a:fillRect/>
-          </a:stretch>
-        </p:blipFill>
-        <p:spPr bwMode="auto">
-          <a:xfrm>
-            <a:off x="6121400" y="787400"/>
-            <a:ext cx="2781300" cy="4229100"/>
-          </a:xfrm>
-          <a:prstGeom prst="rect">
-            <a:avLst/>
-          </a:prstGeom>
-          <a:noFill/>
-          <a:ln w="9525">
-            <a:noFill/>
-            <a:headEnd/>
-            <a:tailEnd/>
-          </a:ln>
-        </p:spPr>
-      </p:pic>
-    </p:spTree>
-  </p:cSld>
-</p:sld>
-</file>
-
-<file path=ppt/slides/slide11.xml><?xml version="1.0" encoding="utf-8"?>
 <p:sld xmlns:a="http://schemas.openxmlformats.org/drawingml/2006/main" xmlns:r="http://schemas.openxmlformats.org/officeDocument/2006/relationships" xmlns:p="http://schemas.openxmlformats.org/presentationml/2006/main">
   <p:cSld>
     <p:spTree>
@@ -3605,7 +3478,7 @@
 </p:sld>
 </file>
 
-<file path=ppt/slides/slide12.xml><?xml version="1.0" encoding="utf-8"?>
+<file path=ppt/slides/slide11.xml><?xml version="1.0" encoding="utf-8"?>
 <p:sld xmlns:a="http://schemas.openxmlformats.org/drawingml/2006/main" xmlns:r="http://schemas.openxmlformats.org/officeDocument/2006/relationships" xmlns:p="http://schemas.openxmlformats.org/presentationml/2006/main">
   <p:cSld>
     <p:spTree>
@@ -3755,7 +3628,7 @@
 </p:sld>
 </file>
 
-<file path=ppt/slides/slide13.xml><?xml version="1.0" encoding="utf-8"?>
+<file path=ppt/slides/slide12.xml><?xml version="1.0" encoding="utf-8"?>
 <p:sld xmlns:a="http://schemas.openxmlformats.org/drawingml/2006/main" xmlns:r="http://schemas.openxmlformats.org/officeDocument/2006/relationships" xmlns:p="http://schemas.openxmlformats.org/presentationml/2006/main">
   <p:cSld>
     <p:spTree>
@@ -3939,7 +3812,11 @@
             </a:pPr>
             <a:r>
               <a:rPr b="1"/>
-              <a:t>Lecture 1: Syllabus</a:t>
+              <a:t>Lecture 1:</a:t>
+            </a:r>
+            <a:r>
+              <a:rPr/>
+              <a:t> Who am I?</a:t>
             </a:r>
           </a:p>
         </p:txBody>
@@ -3962,7 +3839,28 @@
             <a:pPr lvl="0"/>
             <a:r>
               <a:rPr/>
-              <a:t>Please look over the syllabus as it has all the details of the class and how it will run.</a:t>
+              <a:t>Bill Perry</a:t>
+            </a:r>
+          </a:p>
+          <a:p>
+            <a:pPr lvl="0"/>
+            <a:r>
+              <a:rPr/>
+              <a:t>Office is in XXXX</a:t>
+            </a:r>
+          </a:p>
+          <a:p>
+            <a:pPr lvl="0"/>
+            <a:r>
+              <a:rPr/>
+              <a:t>Phone is XXXX</a:t>
+            </a:r>
+          </a:p>
+          <a:p>
+            <a:pPr lvl="0"/>
+            <a:r>
+              <a:rPr/>
+              <a:t>Email is wlperry@d.umn.edu</a:t>
             </a:r>
           </a:p>
         </p:txBody>
@@ -4013,12 +3911,8 @@
               <a:buNone/>
             </a:pPr>
             <a:r>
-              <a:rPr b="1"/>
-              <a:t>Lecture 1:</a:t>
-            </a:r>
-            <a:r>
-              <a:rPr/>
-              <a:t> Who am I?</a:t>
+              <a:rPr/>
+              <a:t>Lecture 1: My goals</a:t>
             </a:r>
           </a:p>
         </p:txBody>
@@ -4041,28 +3935,56 @@
             <a:pPr lvl="0"/>
             <a:r>
               <a:rPr/>
-              <a:t>Bill Perry</a:t>
+              <a:t>How do we make observations and hypotheses?</a:t>
             </a:r>
           </a:p>
           <a:p>
             <a:pPr lvl="0"/>
             <a:r>
               <a:rPr/>
-              <a:t>Office is in XXXX</a:t>
+              <a:t>How do we design an experiment</a:t>
             </a:r>
           </a:p>
           <a:p>
             <a:pPr lvl="0"/>
             <a:r>
               <a:rPr/>
-              <a:t>Phone is XXXX</a:t>
+              <a:t>How do we collect data?</a:t>
             </a:r>
           </a:p>
           <a:p>
             <a:pPr lvl="0"/>
             <a:r>
               <a:rPr/>
-              <a:t>Email is wlperry@d.umn.edu</a:t>
+              <a:t>How do we organize, clean, summarize, and view the data?</a:t>
+            </a:r>
+          </a:p>
+          <a:p>
+            <a:pPr lvl="0"/>
+            <a:r>
+              <a:rPr/>
+              <a:t>How do we use statistics to test our hypotheses</a:t>
+            </a:r>
+          </a:p>
+          <a:p>
+            <a:pPr lvl="1"/>
+            <a:r>
+              <a:rPr/>
+              <a:t>what tests to use</a:t>
+            </a:r>
+          </a:p>
+          <a:p>
+            <a:pPr lvl="1"/>
+            <a:r>
+              <a:rPr/>
+              <a:t>what are the assumptions</a:t>
+            </a:r>
+          </a:p>
+          <a:p>
+            <a:pPr lvl="1"/>
+            <a:r>
+              <a:rPr/>
+              <a:t>what are the interpretations</a:t>
             </a:r>
           </a:p>
         </p:txBody>
@@ -4114,7 +4036,7 @@
             </a:pPr>
             <a:r>
               <a:rPr/>
-              <a:t>Lecture 1: My goals</a:t>
+              <a:t>Lecture 1: My expectations</a:t>
             </a:r>
           </a:p>
         </p:txBody>
@@ -4137,56 +4059,28 @@
             <a:pPr lvl="0"/>
             <a:r>
               <a:rPr/>
-              <a:t>How do we make observations and hypotheses?</a:t>
+              <a:t>Communication</a:t>
             </a:r>
           </a:p>
           <a:p>
             <a:pPr lvl="0"/>
             <a:r>
               <a:rPr/>
-              <a:t>How do we design an experiment</a:t>
+              <a:t>Practice</a:t>
             </a:r>
           </a:p>
           <a:p>
             <a:pPr lvl="0"/>
             <a:r>
               <a:rPr/>
-              <a:t>How do we collect data?</a:t>
+              <a:t>Failure</a:t>
             </a:r>
           </a:p>
           <a:p>
             <a:pPr lvl="0"/>
             <a:r>
               <a:rPr/>
-              <a:t>How do we organize, clean, summarize, and view the data?</a:t>
-            </a:r>
-          </a:p>
-          <a:p>
-            <a:pPr lvl="0"/>
-            <a:r>
-              <a:rPr/>
-              <a:t>How do we use statistics to test our hypotheses</a:t>
-            </a:r>
-          </a:p>
-          <a:p>
-            <a:pPr lvl="1"/>
-            <a:r>
-              <a:rPr/>
-              <a:t>what tests to use</a:t>
-            </a:r>
-          </a:p>
-          <a:p>
-            <a:pPr lvl="1"/>
-            <a:r>
-              <a:rPr/>
-              <a:t>what are the assumptions</a:t>
-            </a:r>
-          </a:p>
-          <a:p>
-            <a:pPr lvl="1"/>
-            <a:r>
-              <a:rPr/>
-              <a:t>what are the interpretations</a:t>
+              <a:t>Learn to correct and troubleshoot</a:t>
             </a:r>
           </a:p>
         </p:txBody>
@@ -4237,8 +4131,8 @@
               <a:buNone/>
             </a:pPr>
             <a:r>
-              <a:rPr/>
-              <a:t>Lecture 1: My expectations</a:t>
+              <a:rPr b="1"/>
+              <a:t>Lecture 1: Science</a:t>
             </a:r>
           </a:p>
         </p:txBody>
@@ -4261,28 +4155,21 @@
             <a:pPr lvl="0"/>
             <a:r>
               <a:rPr/>
-              <a:t>Communication</a:t>
+              <a:t>Way to acquire knowledge, organize it and apply it back to the real world</a:t>
             </a:r>
           </a:p>
           <a:p>
             <a:pPr lvl="0"/>
             <a:r>
               <a:rPr/>
-              <a:t>Practice</a:t>
+              <a:t>Make predictions and testing these predictions using a falsifiable approach - statistics</a:t>
             </a:r>
           </a:p>
           <a:p>
             <a:pPr lvl="0"/>
             <a:r>
               <a:rPr/>
-              <a:t>Failure</a:t>
-            </a:r>
-          </a:p>
-          <a:p>
-            <a:pPr lvl="0"/>
-            <a:r>
-              <a:rPr/>
-              <a:t>Learn to correct and troubleshoot</a:t>
+              <a:t>Explanations that cannot be falsified are not science</a:t>
             </a:r>
           </a:p>
         </p:txBody>
@@ -4333,8 +4220,8 @@
               <a:buNone/>
             </a:pPr>
             <a:r>
-              <a:rPr b="1"/>
-              <a:t>Lecture 1: Science</a:t>
+              <a:rPr/>
+              <a:t>What is Statistics?</a:t>
             </a:r>
           </a:p>
         </p:txBody>
@@ -4354,24 +4241,12 @@
           <a:bodyPr/>
           <a:lstStyle/>
           <a:p>
-            <a:pPr lvl="0"/>
-            <a:r>
-              <a:rPr/>
-              <a:t>Way to acquire knowledge, organize it and apply it back to the real world</a:t>
-            </a:r>
-          </a:p>
-          <a:p>
-            <a:pPr lvl="0"/>
-            <a:r>
-              <a:rPr/>
-              <a:t>Make predictions and testing these predictions using a falsifiable approach - statistics</a:t>
-            </a:r>
-          </a:p>
-          <a:p>
-            <a:pPr lvl="0"/>
-            <a:r>
-              <a:rPr/>
-              <a:t>Explanations that cannot be falsified are not science</a:t>
+            <a:pPr lvl="0" indent="0" marL="0">
+              <a:buNone/>
+            </a:pPr>
+            <a:r>
+              <a:rPr/>
+              <a:t>Zar (1999) - “analysis and interpretation of data with view towards objective evaluation of conclusions based on the data”</a:t>
             </a:r>
           </a:p>
         </p:txBody>
@@ -4382,83 +4257,6 @@
 </file>
 
 <file path=ppt/slides/slide7.xml><?xml version="1.0" encoding="utf-8"?>
-<p:sld xmlns:a="http://schemas.openxmlformats.org/drawingml/2006/main" xmlns:r="http://schemas.openxmlformats.org/officeDocument/2006/relationships" xmlns:p="http://schemas.openxmlformats.org/presentationml/2006/main">
-  <p:cSld>
-    <p:spTree>
-      <p:nvGrpSpPr>
-        <p:cNvPr id="1" name=""/>
-        <p:cNvGrpSpPr/>
-        <p:nvPr/>
-      </p:nvGrpSpPr>
-      <p:grpSpPr>
-        <a:xfrm>
-          <a:off x="0" y="0"/>
-          <a:ext cx="0" cy="0"/>
-          <a:chOff x="0" y="0"/>
-          <a:chExt cx="0" cy="0"/>
-        </a:xfrm>
-      </p:grpSpPr>
-      <p:sp>
-        <p:nvSpPr>
-          <p:cNvPr id="2" name="Title 1"/>
-          <p:cNvSpPr>
-            <a:spLocks noGrp="1"/>
-          </p:cNvSpPr>
-          <p:nvPr>
-            <p:ph type="title"/>
-          </p:nvPr>
-        </p:nvSpPr>
-        <p:spPr>
-          <a:xfrm>
-            <a:off x="0" y="0"/>
-            <a:ext cx="9144000" cy="582780"/>
-          </a:xfrm>
-        </p:spPr>
-        <p:txBody>
-          <a:bodyPr/>
-          <a:lstStyle/>
-          <a:p>
-            <a:pPr lvl="0" indent="0" marL="0">
-              <a:buNone/>
-            </a:pPr>
-            <a:r>
-              <a:rPr/>
-              <a:t>What is Statistics?</a:t>
-            </a:r>
-          </a:p>
-        </p:txBody>
-      </p:sp>
-      <p:sp>
-        <p:nvSpPr>
-          <p:cNvPr id="3" name="Content Placeholder 2"/>
-          <p:cNvSpPr>
-            <a:spLocks noGrp="1"/>
-          </p:cNvSpPr>
-          <p:nvPr>
-            <p:ph idx="1"/>
-          </p:nvPr>
-        </p:nvSpPr>
-        <p:spPr/>
-        <p:txBody>
-          <a:bodyPr/>
-          <a:lstStyle/>
-          <a:p>
-            <a:pPr lvl="0" indent="0" marL="0">
-              <a:buNone/>
-            </a:pPr>
-            <a:r>
-              <a:rPr/>
-              <a:t>Zar (1999) - “analysis and interpretation of data with view towards objective evaluation of conclusions based on the data”</a:t>
-            </a:r>
-          </a:p>
-        </p:txBody>
-      </p:sp>
-    </p:spTree>
-  </p:cSld>
-</p:sld>
-</file>
-
-<file path=ppt/slides/slide8.xml><?xml version="1.0" encoding="utf-8"?>
 <p:sld xmlns:a="http://schemas.openxmlformats.org/drawingml/2006/main" xmlns:r="http://schemas.openxmlformats.org/officeDocument/2006/relationships" xmlns:p="http://schemas.openxmlformats.org/presentationml/2006/main">
   <p:cSld>
     <p:spTree>
@@ -4715,6 +4513,235 @@
 </p:sld>
 </file>
 
+<file path=ppt/slides/slide8.xml><?xml version="1.0" encoding="utf-8"?>
+<p:sld xmlns:a="http://schemas.openxmlformats.org/drawingml/2006/main" xmlns:r="http://schemas.openxmlformats.org/officeDocument/2006/relationships" xmlns:p="http://schemas.openxmlformats.org/presentationml/2006/main">
+  <p:cSld>
+    <p:spTree>
+      <p:nvGrpSpPr>
+        <p:cNvPr id="1" name=""/>
+        <p:cNvGrpSpPr/>
+        <p:nvPr/>
+      </p:nvGrpSpPr>
+      <p:grpSpPr>
+        <a:xfrm>
+          <a:off x="0" y="0"/>
+          <a:ext cx="0" cy="0"/>
+          <a:chOff x="0" y="0"/>
+          <a:chExt cx="0" cy="0"/>
+        </a:xfrm>
+      </p:grpSpPr>
+      <p:sp>
+        <p:nvSpPr>
+          <p:cNvPr id="2" name="Title 1"/>
+          <p:cNvSpPr>
+            <a:spLocks noGrp="1"/>
+          </p:cNvSpPr>
+          <p:nvPr>
+            <p:ph type="title"/>
+          </p:nvPr>
+        </p:nvSpPr>
+        <p:spPr>
+          <a:xfrm>
+            <a:off x="0" y="0"/>
+            <a:ext cx="9144000" cy="602780"/>
+          </a:xfrm>
+          <a:solidFill>
+            <a:srgbClr val="70121D"/>
+          </a:solidFill>
+        </p:spPr>
+        <p:txBody>
+          <a:bodyPr/>
+          <a:lstStyle/>
+          <a:p>
+            <a:pPr lvl="0" indent="0" marL="0">
+              <a:buNone/>
+            </a:pPr>
+            <a:r>
+              <a:rPr b="1"/>
+              <a:t>Lecture 1:</a:t>
+            </a:r>
+            <a:r>
+              <a:rPr/>
+              <a:t> Inductive vs deductive reasoning</a:t>
+            </a:r>
+          </a:p>
+        </p:txBody>
+      </p:sp>
+      <p:sp>
+        <p:nvSpPr>
+          <p:cNvPr id="3" name="Content Placeholder 2"/>
+          <p:cNvSpPr>
+            <a:spLocks noGrp="1"/>
+          </p:cNvSpPr>
+          <p:nvPr>
+            <p:ph idx="1" sz="half"/>
+          </p:nvPr>
+        </p:nvSpPr>
+        <p:spPr/>
+        <p:txBody>
+          <a:bodyPr/>
+          <a:lstStyle/>
+          <a:p>
+            <a:pPr lvl="0" indent="0" marL="0">
+              <a:spcBef>
+                <a:spcPts val="3000"/>
+              </a:spcBef>
+              <a:buNone/>
+            </a:pPr>
+            <a:r>
+              <a:rPr b="1"/>
+              <a:t>Deductive Reasoning (General → Specific)</a:t>
+            </a:r>
+          </a:p>
+          <a:p>
+            <a:pPr lvl="0" indent="0" marL="0">
+              <a:buNone/>
+            </a:pPr>
+            <a:r>
+              <a:rPr/>
+              <a:t>Deductive reasoning starts with a general principle and applies it to a specific case.</a:t>
+            </a:r>
+          </a:p>
+          <a:p>
+            <a:pPr lvl="0" indent="0" marL="0">
+              <a:buNone/>
+            </a:pPr>
+            <a:r>
+              <a:rPr b="1"/>
+              <a:t>Example:</a:t>
+            </a:r>
+          </a:p>
+          <a:p>
+            <a:pPr lvl="0" indent="-342900" marL="342900">
+              <a:buAutoNum type="arabicPeriod"/>
+            </a:pPr>
+            <a:r>
+              <a:rPr b="1"/>
+              <a:t>General Principle:</a:t>
+            </a:r>
+            <a:r>
+              <a:rPr/>
+              <a:t> </a:t>
+            </a:r>
+            <a:r>
+              <a:rPr i="1"/>
+              <a:t>Pine needles from a species of pine tree have a predictable length range (e.g., 70–80 mm).</a:t>
+            </a:r>
+          </a:p>
+          <a:p>
+            <a:pPr lvl="0" indent="-342900" marL="342900">
+              <a:buAutoNum type="arabicPeriod"/>
+            </a:pPr>
+            <a:r>
+              <a:rPr b="1"/>
+              <a:t>Specific Case:</a:t>
+            </a:r>
+            <a:r>
+              <a:rPr/>
+              <a:t> Collect sample of pine needles and measure them.</a:t>
+            </a:r>
+          </a:p>
+          <a:p>
+            <a:pPr lvl="0" indent="-342900" marL="342900">
+              <a:buAutoNum type="arabicPeriod"/>
+            </a:pPr>
+            <a:r>
+              <a:rPr b="1"/>
+              <a:t>Prediction:</a:t>
+            </a:r>
+            <a:r>
+              <a:rPr/>
+              <a:t> Since its the species the needle lengths </a:t>
+            </a:r>
+            <a:r>
+              <a:rPr b="1"/>
+              <a:t>should</a:t>
+            </a:r>
+            <a:r>
+              <a:rPr/>
+              <a:t> fall within 70–80 mm.</a:t>
+            </a:r>
+          </a:p>
+          <a:p>
+            <a:pPr lvl="0" indent="-342900" marL="342900">
+              <a:buAutoNum type="arabicPeriod"/>
+            </a:pPr>
+            <a:r>
+              <a:rPr b="1"/>
+              <a:t>Measurement:</a:t>
+            </a:r>
+            <a:r>
+              <a:rPr/>
+              <a:t> Check the data and confirm needles fall within this expected range.</a:t>
+            </a:r>
+          </a:p>
+          <a:p>
+            <a:pPr lvl="0" indent="0" marL="0">
+              <a:buNone/>
+            </a:pPr>
+            <a:r>
+              <a:rPr b="1"/>
+              <a:t>Conclusion (Deduction):</a:t>
+            </a:r>
+            <a:r>
+              <a:rPr/>
+              <a:t> </a:t>
+            </a:r>
+            <a:r>
+              <a:rPr i="1"/>
+              <a:t>“This tree belongs the species with a needle length range of 70–80 mm, we expect its needle lengths to fall in this range.”</a:t>
+            </a:r>
+          </a:p>
+          <a:p>
+            <a:pPr lvl="0" indent="0" marL="0">
+              <a:buNone/>
+            </a:pPr>
+            <a:r>
+              <a:rPr b="1"/>
+              <a:t>Stronger than induction</a:t>
+            </a:r>
+            <a:r>
+              <a:rPr/>
+              <a:t> because it’s based on a general rule—but if the assumption (length range) is incorrect, conclusion could still be wrong.</a:t>
+            </a:r>
+          </a:p>
+        </p:txBody>
+      </p:sp>
+      <p:pic>
+        <p:nvPicPr>
+          <p:cNvPr descr="images/deductive_phase.png" id="0" name="Picture 1"/>
+          <p:cNvPicPr>
+            <a:picLocks noGrp="1" noChangeAspect="1"/>
+          </p:cNvPicPr>
+          <p:nvPr/>
+        </p:nvPicPr>
+        <p:blipFill>
+          <a:blip r:embed="rId2"/>
+          <a:stretch>
+            <a:fillRect/>
+          </a:stretch>
+        </p:blipFill>
+        <p:spPr bwMode="auto">
+          <a:xfrm>
+            <a:off x="6121400" y="787400"/>
+            <a:ext cx="2781300" cy="4229100"/>
+          </a:xfrm>
+          <a:prstGeom prst="rect">
+            <a:avLst/>
+          </a:prstGeom>
+          <a:noFill/>
+          <a:ln w="9525">
+            <a:noFill/>
+            <a:headEnd/>
+            <a:tailEnd/>
+          </a:ln>
+        </p:spPr>
+      </p:pic>
+    </p:spTree>
+  </p:cSld>
+</p:sld>
+</file>
+
 <file path=ppt/slides/slide9.xml><?xml version="1.0" encoding="utf-8"?>
 <p:sld xmlns:a="http://schemas.openxmlformats.org/drawingml/2006/main" xmlns:r="http://schemas.openxmlformats.org/officeDocument/2006/relationships" xmlns:p="http://schemas.openxmlformats.org/presentationml/2006/main">
   <p:cSld>
@@ -4792,119 +4819,7 @@
             </a:pPr>
             <a:r>
               <a:rPr b="1"/>
-              <a:t>Deductive Reasoning (General → Specific)</a:t>
-            </a:r>
-          </a:p>
-          <a:p>
-            <a:pPr lvl="0" indent="0" marL="0">
-              <a:buNone/>
-            </a:pPr>
-            <a:r>
-              <a:rPr/>
-              <a:t>Deductive reasoning starts with a general principle and applies it to a specific case.</a:t>
-            </a:r>
-          </a:p>
-          <a:p>
-            <a:pPr lvl="0" indent="0" marL="0">
-              <a:buNone/>
-            </a:pPr>
-            <a:r>
-              <a:rPr b="1"/>
-              <a:t>Example:</a:t>
-            </a:r>
-          </a:p>
-          <a:p>
-            <a:pPr lvl="0" indent="-342900" marL="342900">
-              <a:buAutoNum type="arabicPeriod"/>
-            </a:pPr>
-            <a:r>
-              <a:rPr b="1"/>
-              <a:t>General Principle:</a:t>
-            </a:r>
-            <a:r>
-              <a:rPr/>
-              <a:t> </a:t>
-            </a:r>
-            <a:r>
-              <a:rPr i="1"/>
-              <a:t>Pine needles from a species of pine tree have a predictable length range (e.g., 70–80 mm).</a:t>
-            </a:r>
-          </a:p>
-          <a:p>
-            <a:pPr lvl="0" indent="-342900" marL="342900">
-              <a:buAutoNum type="arabicPeriod"/>
-            </a:pPr>
-            <a:r>
-              <a:rPr b="1"/>
-              <a:t>Specific Case:</a:t>
-            </a:r>
-            <a:r>
-              <a:rPr/>
-              <a:t> Collect sample of pine needles and measure them.</a:t>
-            </a:r>
-          </a:p>
-          <a:p>
-            <a:pPr lvl="0" indent="-342900" marL="342900">
-              <a:buAutoNum type="arabicPeriod"/>
-            </a:pPr>
-            <a:r>
-              <a:rPr b="1"/>
-              <a:t>Prediction:</a:t>
-            </a:r>
-            <a:r>
-              <a:rPr/>
-              <a:t> Since its the species the needle lengths </a:t>
-            </a:r>
-            <a:r>
-              <a:rPr b="1"/>
-              <a:t>should</a:t>
-            </a:r>
-            <a:r>
-              <a:rPr/>
-              <a:t> fall within 70–80 mm.</a:t>
-            </a:r>
-          </a:p>
-          <a:p>
-            <a:pPr lvl="0" indent="-342900" marL="342900">
-              <a:buAutoNum type="arabicPeriod"/>
-            </a:pPr>
-            <a:r>
-              <a:rPr b="1"/>
-              <a:t>Measurement:</a:t>
-            </a:r>
-            <a:r>
-              <a:rPr/>
-              <a:t> Check the data and confirm needles fall within this expected range.</a:t>
-            </a:r>
-          </a:p>
-          <a:p>
-            <a:pPr lvl="0" indent="0" marL="0">
-              <a:buNone/>
-            </a:pPr>
-            <a:r>
-              <a:rPr b="1"/>
-              <a:t>Conclusion (Deduction):</a:t>
-            </a:r>
-            <a:r>
-              <a:rPr/>
-              <a:t> </a:t>
-            </a:r>
-            <a:r>
-              <a:rPr i="1"/>
-              <a:t>“This tree belongs the species with a needle length range of 70–80 mm, we expect its needle lengths to fall in this range.”</a:t>
-            </a:r>
-          </a:p>
-          <a:p>
-            <a:pPr lvl="0" indent="0" marL="0">
-              <a:buNone/>
-            </a:pPr>
-            <a:r>
-              <a:rPr b="1"/>
-              <a:t>Stronger than induction</a:t>
-            </a:r>
-            <a:r>
-              <a:rPr/>
-              <a:t> because it’s based on a general rule—but if the assumption (length range) is incorrect, conclusion could still be wrong.</a:t>
+              <a:t>In reality we are doing both of these processes</a:t>
             </a:r>
           </a:p>
         </p:txBody>

</xml_diff>

<commit_message>
Ok going back in time to get this right
</commit_message>
<xml_diff>
--- a/docs/lectures/lecture_01/01_1_lecture_powerpoint.pptx
+++ b/docs/lectures/lecture_01/01_1_lecture_powerpoint.pptx
@@ -17,6 +17,7 @@
     <p:sldId id="265" r:id="rId11"/>
     <p:sldId id="266" r:id="rId12"/>
     <p:sldId id="267" r:id="rId13"/>
+    <p:sldId id="268" r:id="rId14"/>
   </p:sldIdLst>
   <p:sldSz cx="9144000" cy="5143500" type="screen16x9"/>
   <p:notesSz cx="6858000" cy="9144000"/>
@@ -3286,13 +3287,13 @@
             <a:spLocks noGrp="1"/>
           </p:cNvSpPr>
           <p:nvPr>
-            <p:ph type="title"/>
+            <p:ph type="ctrTitle"/>
           </p:nvPr>
         </p:nvSpPr>
         <p:spPr>
           <a:xfrm>
-            <a:off x="0" y="0"/>
-            <a:ext cx="9144000" cy="582780"/>
+            <a:off x="0" y="1"/>
+            <a:ext cx="9144000" cy="565688"/>
           </a:xfrm>
         </p:spPr>
         <p:txBody>
@@ -3303,31 +3304,40 @@
               <a:buNone/>
             </a:pPr>
             <a:r>
-              <a:rPr b="1"/>
-              <a:t>Lecture 1: Syllabus</a:t>
-            </a:r>
-          </a:p>
-        </p:txBody>
-      </p:sp>
-      <p:sp>
-        <p:nvSpPr>
-          <p:cNvPr id="3" name="Content Placeholder 2"/>
-          <p:cNvSpPr>
-            <a:spLocks noGrp="1"/>
-          </p:cNvSpPr>
-          <p:nvPr>
-            <p:ph idx="1"/>
-          </p:nvPr>
-        </p:nvSpPr>
-        <p:spPr/>
-        <p:txBody>
-          <a:bodyPr/>
-          <a:lstStyle/>
-          <a:p>
-            <a:pPr lvl="0"/>
-            <a:r>
-              <a:rPr/>
-              <a:t>Please look over the syllabus as it has all the details of the class and how it will run.</a:t>
+              <a:rPr/>
+              <a:t>01_Lecture</a:t>
+            </a:r>
+          </a:p>
+        </p:txBody>
+      </p:sp>
+      <p:sp>
+        <p:nvSpPr>
+          <p:cNvPr id="3" name="Subtitle 2"/>
+          <p:cNvSpPr>
+            <a:spLocks noGrp="1"/>
+          </p:cNvSpPr>
+          <p:nvPr>
+            <p:ph idx="1" type="subTitle"/>
+          </p:nvPr>
+        </p:nvSpPr>
+        <p:spPr>
+          <a:xfrm>
+            <a:off x="255722" y="565689"/>
+            <a:ext cx="6400800" cy="1314450"/>
+          </a:xfrm>
+        </p:spPr>
+        <p:txBody>
+          <a:bodyPr/>
+          <a:lstStyle/>
+          <a:p>
+            <a:pPr lvl="0" indent="0" marL="0">
+              <a:buNone/>
+            </a:pPr>
+            <a:br/>
+            <a:br/>
+            <a:r>
+              <a:rPr/>
+              <a:t>Bill Perry</a:t>
             </a:r>
           </a:p>
         </p:txBody>
@@ -3338,6 +3348,123 @@
 </file>
 
 <file path=ppt/slides/slide10.xml><?xml version="1.0" encoding="utf-8"?>
+<p:sld xmlns:a="http://schemas.openxmlformats.org/drawingml/2006/main" xmlns:r="http://schemas.openxmlformats.org/officeDocument/2006/relationships" xmlns:p="http://schemas.openxmlformats.org/presentationml/2006/main">
+  <p:cSld>
+    <p:spTree>
+      <p:nvGrpSpPr>
+        <p:cNvPr id="1" name=""/>
+        <p:cNvGrpSpPr/>
+        <p:nvPr/>
+      </p:nvGrpSpPr>
+      <p:grpSpPr>
+        <a:xfrm>
+          <a:off x="0" y="0"/>
+          <a:ext cx="0" cy="0"/>
+          <a:chOff x="0" y="0"/>
+          <a:chExt cx="0" cy="0"/>
+        </a:xfrm>
+      </p:grpSpPr>
+      <p:sp>
+        <p:nvSpPr>
+          <p:cNvPr id="2" name="Title 1"/>
+          <p:cNvSpPr>
+            <a:spLocks noGrp="1"/>
+          </p:cNvSpPr>
+          <p:nvPr>
+            <p:ph type="title"/>
+          </p:nvPr>
+        </p:nvSpPr>
+        <p:spPr>
+          <a:xfrm>
+            <a:off x="0" y="0"/>
+            <a:ext cx="9144000" cy="602780"/>
+          </a:xfrm>
+          <a:solidFill>
+            <a:srgbClr val="70121D"/>
+          </a:solidFill>
+        </p:spPr>
+        <p:txBody>
+          <a:bodyPr/>
+          <a:lstStyle/>
+          <a:p>
+            <a:pPr lvl="0" indent="0" marL="0">
+              <a:buNone/>
+            </a:pPr>
+            <a:r>
+              <a:rPr b="1"/>
+              <a:t>Lecture 1:</a:t>
+            </a:r>
+            <a:r>
+              <a:rPr/>
+              <a:t> Inductive vs deductive reasoning</a:t>
+            </a:r>
+          </a:p>
+        </p:txBody>
+      </p:sp>
+      <p:sp>
+        <p:nvSpPr>
+          <p:cNvPr id="3" name="Content Placeholder 2"/>
+          <p:cNvSpPr>
+            <a:spLocks noGrp="1"/>
+          </p:cNvSpPr>
+          <p:nvPr>
+            <p:ph idx="1" sz="half"/>
+          </p:nvPr>
+        </p:nvSpPr>
+        <p:spPr/>
+        <p:txBody>
+          <a:bodyPr/>
+          <a:lstStyle/>
+          <a:p>
+            <a:pPr lvl="0" indent="0" marL="0">
+              <a:spcBef>
+                <a:spcPts val="3000"/>
+              </a:spcBef>
+              <a:buNone/>
+            </a:pPr>
+            <a:r>
+              <a:rPr b="1"/>
+              <a:t>In reality we are doing both of these processes</a:t>
+            </a:r>
+          </a:p>
+        </p:txBody>
+      </p:sp>
+      <p:pic>
+        <p:nvPicPr>
+          <p:cNvPr descr="images/deductive_phase.png" id="0" name="Picture 1"/>
+          <p:cNvPicPr>
+            <a:picLocks noGrp="1" noChangeAspect="1"/>
+          </p:cNvPicPr>
+          <p:nvPr/>
+        </p:nvPicPr>
+        <p:blipFill>
+          <a:blip r:embed="rId2"/>
+          <a:stretch>
+            <a:fillRect/>
+          </a:stretch>
+        </p:blipFill>
+        <p:spPr bwMode="auto">
+          <a:xfrm>
+            <a:off x="6121400" y="787400"/>
+            <a:ext cx="2781300" cy="4229100"/>
+          </a:xfrm>
+          <a:prstGeom prst="rect">
+            <a:avLst/>
+          </a:prstGeom>
+          <a:noFill/>
+          <a:ln w="9525">
+            <a:noFill/>
+            <a:headEnd/>
+            <a:tailEnd/>
+          </a:ln>
+        </p:spPr>
+      </p:pic>
+    </p:spTree>
+  </p:cSld>
+</p:sld>
+</file>
+
+<file path=ppt/slides/slide11.xml><?xml version="1.0" encoding="utf-8"?>
 <p:sld xmlns:a="http://schemas.openxmlformats.org/drawingml/2006/main" xmlns:r="http://schemas.openxmlformats.org/officeDocument/2006/relationships" xmlns:p="http://schemas.openxmlformats.org/presentationml/2006/main">
   <p:cSld>
     <p:spTree>
@@ -3478,7 +3605,7 @@
 </p:sld>
 </file>
 
-<file path=ppt/slides/slide11.xml><?xml version="1.0" encoding="utf-8"?>
+<file path=ppt/slides/slide12.xml><?xml version="1.0" encoding="utf-8"?>
 <p:sld xmlns:a="http://schemas.openxmlformats.org/drawingml/2006/main" xmlns:r="http://schemas.openxmlformats.org/officeDocument/2006/relationships" xmlns:p="http://schemas.openxmlformats.org/presentationml/2006/main">
   <p:cSld>
     <p:spTree>
@@ -3628,7 +3755,7 @@
 </p:sld>
 </file>
 
-<file path=ppt/slides/slide12.xml><?xml version="1.0" encoding="utf-8"?>
+<file path=ppt/slides/slide13.xml><?xml version="1.0" encoding="utf-8"?>
 <p:sld xmlns:a="http://schemas.openxmlformats.org/drawingml/2006/main" xmlns:r="http://schemas.openxmlformats.org/officeDocument/2006/relationships" xmlns:p="http://schemas.openxmlformats.org/presentationml/2006/main">
   <p:cSld>
     <p:spTree>
@@ -3812,11 +3939,7 @@
             </a:pPr>
             <a:r>
               <a:rPr b="1"/>
-              <a:t>Lecture 1:</a:t>
-            </a:r>
-            <a:r>
-              <a:rPr/>
-              <a:t> Who am I?</a:t>
+              <a:t>Lecture 1: Syllabus</a:t>
             </a:r>
           </a:p>
         </p:txBody>
@@ -3839,28 +3962,7 @@
             <a:pPr lvl="0"/>
             <a:r>
               <a:rPr/>
-              <a:t>Bill Perry</a:t>
-            </a:r>
-          </a:p>
-          <a:p>
-            <a:pPr lvl="0"/>
-            <a:r>
-              <a:rPr/>
-              <a:t>Office is in XXXX</a:t>
-            </a:r>
-          </a:p>
-          <a:p>
-            <a:pPr lvl="0"/>
-            <a:r>
-              <a:rPr/>
-              <a:t>Phone is XXXX</a:t>
-            </a:r>
-          </a:p>
-          <a:p>
-            <a:pPr lvl="0"/>
-            <a:r>
-              <a:rPr/>
-              <a:t>Email is wlperry@d.umn.edu</a:t>
+              <a:t>Please look over the syllabus as it has all the details of the class and how it will run.</a:t>
             </a:r>
           </a:p>
         </p:txBody>
@@ -3911,8 +4013,12 @@
               <a:buNone/>
             </a:pPr>
             <a:r>
-              <a:rPr/>
-              <a:t>Lecture 1: My goals</a:t>
+              <a:rPr b="1"/>
+              <a:t>Lecture 1:</a:t>
+            </a:r>
+            <a:r>
+              <a:rPr/>
+              <a:t> Who am I?</a:t>
             </a:r>
           </a:p>
         </p:txBody>
@@ -3935,56 +4041,28 @@
             <a:pPr lvl="0"/>
             <a:r>
               <a:rPr/>
-              <a:t>How do we make observations and hypotheses?</a:t>
+              <a:t>Bill Perry</a:t>
             </a:r>
           </a:p>
           <a:p>
             <a:pPr lvl="0"/>
             <a:r>
               <a:rPr/>
-              <a:t>How do we design an experiment</a:t>
+              <a:t>Office is in XXXX</a:t>
             </a:r>
           </a:p>
           <a:p>
             <a:pPr lvl="0"/>
             <a:r>
               <a:rPr/>
-              <a:t>How do we collect data?</a:t>
+              <a:t>Phone is XXXX</a:t>
             </a:r>
           </a:p>
           <a:p>
             <a:pPr lvl="0"/>
             <a:r>
               <a:rPr/>
-              <a:t>How do we organize, clean, summarize, and view the data?</a:t>
-            </a:r>
-          </a:p>
-          <a:p>
-            <a:pPr lvl="0"/>
-            <a:r>
-              <a:rPr/>
-              <a:t>How do we use statistics to test our hypotheses</a:t>
-            </a:r>
-          </a:p>
-          <a:p>
-            <a:pPr lvl="1"/>
-            <a:r>
-              <a:rPr/>
-              <a:t>what tests to use</a:t>
-            </a:r>
-          </a:p>
-          <a:p>
-            <a:pPr lvl="1"/>
-            <a:r>
-              <a:rPr/>
-              <a:t>what are the assumptions</a:t>
-            </a:r>
-          </a:p>
-          <a:p>
-            <a:pPr lvl="1"/>
-            <a:r>
-              <a:rPr/>
-              <a:t>what are the interpretations</a:t>
+              <a:t>Email is wlperry@d.umn.edu</a:t>
             </a:r>
           </a:p>
         </p:txBody>
@@ -4036,7 +4114,7 @@
             </a:pPr>
             <a:r>
               <a:rPr/>
-              <a:t>Lecture 1: My expectations</a:t>
+              <a:t>Lecture 1: My goals</a:t>
             </a:r>
           </a:p>
         </p:txBody>
@@ -4059,28 +4137,56 @@
             <a:pPr lvl="0"/>
             <a:r>
               <a:rPr/>
-              <a:t>Communication</a:t>
+              <a:t>How do we make observations and hypotheses?</a:t>
             </a:r>
           </a:p>
           <a:p>
             <a:pPr lvl="0"/>
             <a:r>
               <a:rPr/>
-              <a:t>Practice</a:t>
+              <a:t>How do we design an experiment</a:t>
             </a:r>
           </a:p>
           <a:p>
             <a:pPr lvl="0"/>
             <a:r>
               <a:rPr/>
-              <a:t>Failure</a:t>
+              <a:t>How do we collect data?</a:t>
             </a:r>
           </a:p>
           <a:p>
             <a:pPr lvl="0"/>
             <a:r>
               <a:rPr/>
-              <a:t>Learn to correct and troubleshoot</a:t>
+              <a:t>How do we organize, clean, summarize, and view the data?</a:t>
+            </a:r>
+          </a:p>
+          <a:p>
+            <a:pPr lvl="0"/>
+            <a:r>
+              <a:rPr/>
+              <a:t>How do we use statistics to test our hypotheses</a:t>
+            </a:r>
+          </a:p>
+          <a:p>
+            <a:pPr lvl="1"/>
+            <a:r>
+              <a:rPr/>
+              <a:t>what tests to use</a:t>
+            </a:r>
+          </a:p>
+          <a:p>
+            <a:pPr lvl="1"/>
+            <a:r>
+              <a:rPr/>
+              <a:t>what are the assumptions</a:t>
+            </a:r>
+          </a:p>
+          <a:p>
+            <a:pPr lvl="1"/>
+            <a:r>
+              <a:rPr/>
+              <a:t>what are the interpretations</a:t>
             </a:r>
           </a:p>
         </p:txBody>
@@ -4131,8 +4237,8 @@
               <a:buNone/>
             </a:pPr>
             <a:r>
-              <a:rPr b="1"/>
-              <a:t>Lecture 1: Science</a:t>
+              <a:rPr/>
+              <a:t>Lecture 1: My expectations</a:t>
             </a:r>
           </a:p>
         </p:txBody>
@@ -4155,21 +4261,28 @@
             <a:pPr lvl="0"/>
             <a:r>
               <a:rPr/>
-              <a:t>Way to acquire knowledge, organize it and apply it back to the real world</a:t>
+              <a:t>Communication</a:t>
             </a:r>
           </a:p>
           <a:p>
             <a:pPr lvl="0"/>
             <a:r>
               <a:rPr/>
-              <a:t>Make predictions and testing these predictions using a falsifiable approach - statistics</a:t>
+              <a:t>Practice</a:t>
             </a:r>
           </a:p>
           <a:p>
             <a:pPr lvl="0"/>
             <a:r>
               <a:rPr/>
-              <a:t>Explanations that cannot be falsified are not science</a:t>
+              <a:t>Failure</a:t>
+            </a:r>
+          </a:p>
+          <a:p>
+            <a:pPr lvl="0"/>
+            <a:r>
+              <a:rPr/>
+              <a:t>Learn to correct and troubleshoot</a:t>
             </a:r>
           </a:p>
         </p:txBody>
@@ -4220,8 +4333,8 @@
               <a:buNone/>
             </a:pPr>
             <a:r>
-              <a:rPr/>
-              <a:t>What is Statistics?</a:t>
+              <a:rPr b="1"/>
+              <a:t>Lecture 1: Science</a:t>
             </a:r>
           </a:p>
         </p:txBody>
@@ -4241,12 +4354,24 @@
           <a:bodyPr/>
           <a:lstStyle/>
           <a:p>
-            <a:pPr lvl="0" indent="0" marL="0">
-              <a:buNone/>
-            </a:pPr>
-            <a:r>
-              <a:rPr/>
-              <a:t>Zar (1999) - “analysis and interpretation of data with view towards objective evaluation of conclusions based on the data”</a:t>
+            <a:pPr lvl="0"/>
+            <a:r>
+              <a:rPr/>
+              <a:t>Way to acquire knowledge, organize it and apply it back to the real world</a:t>
+            </a:r>
+          </a:p>
+          <a:p>
+            <a:pPr lvl="0"/>
+            <a:r>
+              <a:rPr/>
+              <a:t>Make predictions and testing these predictions using a falsifiable approach - statistics</a:t>
+            </a:r>
+          </a:p>
+          <a:p>
+            <a:pPr lvl="0"/>
+            <a:r>
+              <a:rPr/>
+              <a:t>Explanations that cannot be falsified are not science</a:t>
             </a:r>
           </a:p>
         </p:txBody>
@@ -4257,6 +4382,83 @@
 </file>
 
 <file path=ppt/slides/slide7.xml><?xml version="1.0" encoding="utf-8"?>
+<p:sld xmlns:a="http://schemas.openxmlformats.org/drawingml/2006/main" xmlns:r="http://schemas.openxmlformats.org/officeDocument/2006/relationships" xmlns:p="http://schemas.openxmlformats.org/presentationml/2006/main">
+  <p:cSld>
+    <p:spTree>
+      <p:nvGrpSpPr>
+        <p:cNvPr id="1" name=""/>
+        <p:cNvGrpSpPr/>
+        <p:nvPr/>
+      </p:nvGrpSpPr>
+      <p:grpSpPr>
+        <a:xfrm>
+          <a:off x="0" y="0"/>
+          <a:ext cx="0" cy="0"/>
+          <a:chOff x="0" y="0"/>
+          <a:chExt cx="0" cy="0"/>
+        </a:xfrm>
+      </p:grpSpPr>
+      <p:sp>
+        <p:nvSpPr>
+          <p:cNvPr id="2" name="Title 1"/>
+          <p:cNvSpPr>
+            <a:spLocks noGrp="1"/>
+          </p:cNvSpPr>
+          <p:nvPr>
+            <p:ph type="title"/>
+          </p:nvPr>
+        </p:nvSpPr>
+        <p:spPr>
+          <a:xfrm>
+            <a:off x="0" y="0"/>
+            <a:ext cx="9144000" cy="582780"/>
+          </a:xfrm>
+        </p:spPr>
+        <p:txBody>
+          <a:bodyPr/>
+          <a:lstStyle/>
+          <a:p>
+            <a:pPr lvl="0" indent="0" marL="0">
+              <a:buNone/>
+            </a:pPr>
+            <a:r>
+              <a:rPr/>
+              <a:t>What is Statistics?</a:t>
+            </a:r>
+          </a:p>
+        </p:txBody>
+      </p:sp>
+      <p:sp>
+        <p:nvSpPr>
+          <p:cNvPr id="3" name="Content Placeholder 2"/>
+          <p:cNvSpPr>
+            <a:spLocks noGrp="1"/>
+          </p:cNvSpPr>
+          <p:nvPr>
+            <p:ph idx="1"/>
+          </p:nvPr>
+        </p:nvSpPr>
+        <p:spPr/>
+        <p:txBody>
+          <a:bodyPr/>
+          <a:lstStyle/>
+          <a:p>
+            <a:pPr lvl="0" indent="0" marL="0">
+              <a:buNone/>
+            </a:pPr>
+            <a:r>
+              <a:rPr/>
+              <a:t>Zar (1999) - “analysis and interpretation of data with view towards objective evaluation of conclusions based on the data”</a:t>
+            </a:r>
+          </a:p>
+        </p:txBody>
+      </p:sp>
+    </p:spTree>
+  </p:cSld>
+</p:sld>
+</file>
+
+<file path=ppt/slides/slide8.xml><?xml version="1.0" encoding="utf-8"?>
 <p:sld xmlns:a="http://schemas.openxmlformats.org/drawingml/2006/main" xmlns:r="http://schemas.openxmlformats.org/officeDocument/2006/relationships" xmlns:p="http://schemas.openxmlformats.org/presentationml/2006/main">
   <p:cSld>
     <p:spTree>
@@ -4513,235 +4715,6 @@
 </p:sld>
 </file>
 
-<file path=ppt/slides/slide8.xml><?xml version="1.0" encoding="utf-8"?>
-<p:sld xmlns:a="http://schemas.openxmlformats.org/drawingml/2006/main" xmlns:r="http://schemas.openxmlformats.org/officeDocument/2006/relationships" xmlns:p="http://schemas.openxmlformats.org/presentationml/2006/main">
-  <p:cSld>
-    <p:spTree>
-      <p:nvGrpSpPr>
-        <p:cNvPr id="1" name=""/>
-        <p:cNvGrpSpPr/>
-        <p:nvPr/>
-      </p:nvGrpSpPr>
-      <p:grpSpPr>
-        <a:xfrm>
-          <a:off x="0" y="0"/>
-          <a:ext cx="0" cy="0"/>
-          <a:chOff x="0" y="0"/>
-          <a:chExt cx="0" cy="0"/>
-        </a:xfrm>
-      </p:grpSpPr>
-      <p:sp>
-        <p:nvSpPr>
-          <p:cNvPr id="2" name="Title 1"/>
-          <p:cNvSpPr>
-            <a:spLocks noGrp="1"/>
-          </p:cNvSpPr>
-          <p:nvPr>
-            <p:ph type="title"/>
-          </p:nvPr>
-        </p:nvSpPr>
-        <p:spPr>
-          <a:xfrm>
-            <a:off x="0" y="0"/>
-            <a:ext cx="9144000" cy="602780"/>
-          </a:xfrm>
-          <a:solidFill>
-            <a:srgbClr val="70121D"/>
-          </a:solidFill>
-        </p:spPr>
-        <p:txBody>
-          <a:bodyPr/>
-          <a:lstStyle/>
-          <a:p>
-            <a:pPr lvl="0" indent="0" marL="0">
-              <a:buNone/>
-            </a:pPr>
-            <a:r>
-              <a:rPr b="1"/>
-              <a:t>Lecture 1:</a:t>
-            </a:r>
-            <a:r>
-              <a:rPr/>
-              <a:t> Inductive vs deductive reasoning</a:t>
-            </a:r>
-          </a:p>
-        </p:txBody>
-      </p:sp>
-      <p:sp>
-        <p:nvSpPr>
-          <p:cNvPr id="3" name="Content Placeholder 2"/>
-          <p:cNvSpPr>
-            <a:spLocks noGrp="1"/>
-          </p:cNvSpPr>
-          <p:nvPr>
-            <p:ph idx="1" sz="half"/>
-          </p:nvPr>
-        </p:nvSpPr>
-        <p:spPr/>
-        <p:txBody>
-          <a:bodyPr/>
-          <a:lstStyle/>
-          <a:p>
-            <a:pPr lvl="0" indent="0" marL="0">
-              <a:spcBef>
-                <a:spcPts val="3000"/>
-              </a:spcBef>
-              <a:buNone/>
-            </a:pPr>
-            <a:r>
-              <a:rPr b="1"/>
-              <a:t>Deductive Reasoning (General → Specific)</a:t>
-            </a:r>
-          </a:p>
-          <a:p>
-            <a:pPr lvl="0" indent="0" marL="0">
-              <a:buNone/>
-            </a:pPr>
-            <a:r>
-              <a:rPr/>
-              <a:t>Deductive reasoning starts with a general principle and applies it to a specific case.</a:t>
-            </a:r>
-          </a:p>
-          <a:p>
-            <a:pPr lvl="0" indent="0" marL="0">
-              <a:buNone/>
-            </a:pPr>
-            <a:r>
-              <a:rPr b="1"/>
-              <a:t>Example:</a:t>
-            </a:r>
-          </a:p>
-          <a:p>
-            <a:pPr lvl="0" indent="-342900" marL="342900">
-              <a:buAutoNum type="arabicPeriod"/>
-            </a:pPr>
-            <a:r>
-              <a:rPr b="1"/>
-              <a:t>General Principle:</a:t>
-            </a:r>
-            <a:r>
-              <a:rPr/>
-              <a:t> </a:t>
-            </a:r>
-            <a:r>
-              <a:rPr i="1"/>
-              <a:t>Pine needles from a species of pine tree have a predictable length range (e.g., 70–80 mm).</a:t>
-            </a:r>
-          </a:p>
-          <a:p>
-            <a:pPr lvl="0" indent="-342900" marL="342900">
-              <a:buAutoNum type="arabicPeriod"/>
-            </a:pPr>
-            <a:r>
-              <a:rPr b="1"/>
-              <a:t>Specific Case:</a:t>
-            </a:r>
-            <a:r>
-              <a:rPr/>
-              <a:t> Collect sample of pine needles and measure them.</a:t>
-            </a:r>
-          </a:p>
-          <a:p>
-            <a:pPr lvl="0" indent="-342900" marL="342900">
-              <a:buAutoNum type="arabicPeriod"/>
-            </a:pPr>
-            <a:r>
-              <a:rPr b="1"/>
-              <a:t>Prediction:</a:t>
-            </a:r>
-            <a:r>
-              <a:rPr/>
-              <a:t> Since its the species the needle lengths </a:t>
-            </a:r>
-            <a:r>
-              <a:rPr b="1"/>
-              <a:t>should</a:t>
-            </a:r>
-            <a:r>
-              <a:rPr/>
-              <a:t> fall within 70–80 mm.</a:t>
-            </a:r>
-          </a:p>
-          <a:p>
-            <a:pPr lvl="0" indent="-342900" marL="342900">
-              <a:buAutoNum type="arabicPeriod"/>
-            </a:pPr>
-            <a:r>
-              <a:rPr b="1"/>
-              <a:t>Measurement:</a:t>
-            </a:r>
-            <a:r>
-              <a:rPr/>
-              <a:t> Check the data and confirm needles fall within this expected range.</a:t>
-            </a:r>
-          </a:p>
-          <a:p>
-            <a:pPr lvl="0" indent="0" marL="0">
-              <a:buNone/>
-            </a:pPr>
-            <a:r>
-              <a:rPr b="1"/>
-              <a:t>Conclusion (Deduction):</a:t>
-            </a:r>
-            <a:r>
-              <a:rPr/>
-              <a:t> </a:t>
-            </a:r>
-            <a:r>
-              <a:rPr i="1"/>
-              <a:t>“This tree belongs the species with a needle length range of 70–80 mm, we expect its needle lengths to fall in this range.”</a:t>
-            </a:r>
-          </a:p>
-          <a:p>
-            <a:pPr lvl="0" indent="0" marL="0">
-              <a:buNone/>
-            </a:pPr>
-            <a:r>
-              <a:rPr b="1"/>
-              <a:t>Stronger than induction</a:t>
-            </a:r>
-            <a:r>
-              <a:rPr/>
-              <a:t> because it’s based on a general rule—but if the assumption (length range) is incorrect, conclusion could still be wrong.</a:t>
-            </a:r>
-          </a:p>
-        </p:txBody>
-      </p:sp>
-      <p:pic>
-        <p:nvPicPr>
-          <p:cNvPr descr="images/deductive_phase.png" id="0" name="Picture 1"/>
-          <p:cNvPicPr>
-            <a:picLocks noGrp="1" noChangeAspect="1"/>
-          </p:cNvPicPr>
-          <p:nvPr/>
-        </p:nvPicPr>
-        <p:blipFill>
-          <a:blip r:embed="rId2"/>
-          <a:stretch>
-            <a:fillRect/>
-          </a:stretch>
-        </p:blipFill>
-        <p:spPr bwMode="auto">
-          <a:xfrm>
-            <a:off x="6121400" y="787400"/>
-            <a:ext cx="2781300" cy="4229100"/>
-          </a:xfrm>
-          <a:prstGeom prst="rect">
-            <a:avLst/>
-          </a:prstGeom>
-          <a:noFill/>
-          <a:ln w="9525">
-            <a:noFill/>
-            <a:headEnd/>
-            <a:tailEnd/>
-          </a:ln>
-        </p:spPr>
-      </p:pic>
-    </p:spTree>
-  </p:cSld>
-</p:sld>
-</file>
-
 <file path=ppt/slides/slide9.xml><?xml version="1.0" encoding="utf-8"?>
 <p:sld xmlns:a="http://schemas.openxmlformats.org/drawingml/2006/main" xmlns:r="http://schemas.openxmlformats.org/officeDocument/2006/relationships" xmlns:p="http://schemas.openxmlformats.org/presentationml/2006/main">
   <p:cSld>
@@ -4819,7 +4792,119 @@
             </a:pPr>
             <a:r>
               <a:rPr b="1"/>
-              <a:t>In reality we are doing both of these processes</a:t>
+              <a:t>Deductive Reasoning (General → Specific)</a:t>
+            </a:r>
+          </a:p>
+          <a:p>
+            <a:pPr lvl="0" indent="0" marL="0">
+              <a:buNone/>
+            </a:pPr>
+            <a:r>
+              <a:rPr/>
+              <a:t>Deductive reasoning starts with a general principle and applies it to a specific case.</a:t>
+            </a:r>
+          </a:p>
+          <a:p>
+            <a:pPr lvl="0" indent="0" marL="0">
+              <a:buNone/>
+            </a:pPr>
+            <a:r>
+              <a:rPr b="1"/>
+              <a:t>Example:</a:t>
+            </a:r>
+          </a:p>
+          <a:p>
+            <a:pPr lvl="0" indent="-342900" marL="342900">
+              <a:buAutoNum type="arabicPeriod"/>
+            </a:pPr>
+            <a:r>
+              <a:rPr b="1"/>
+              <a:t>General Principle:</a:t>
+            </a:r>
+            <a:r>
+              <a:rPr/>
+              <a:t> </a:t>
+            </a:r>
+            <a:r>
+              <a:rPr i="1"/>
+              <a:t>Pine needles from a species of pine tree have a predictable length range (e.g., 70–80 mm).</a:t>
+            </a:r>
+          </a:p>
+          <a:p>
+            <a:pPr lvl="0" indent="-342900" marL="342900">
+              <a:buAutoNum type="arabicPeriod"/>
+            </a:pPr>
+            <a:r>
+              <a:rPr b="1"/>
+              <a:t>Specific Case:</a:t>
+            </a:r>
+            <a:r>
+              <a:rPr/>
+              <a:t> Collect sample of pine needles and measure them.</a:t>
+            </a:r>
+          </a:p>
+          <a:p>
+            <a:pPr lvl="0" indent="-342900" marL="342900">
+              <a:buAutoNum type="arabicPeriod"/>
+            </a:pPr>
+            <a:r>
+              <a:rPr b="1"/>
+              <a:t>Prediction:</a:t>
+            </a:r>
+            <a:r>
+              <a:rPr/>
+              <a:t> Since its the species the needle lengths </a:t>
+            </a:r>
+            <a:r>
+              <a:rPr b="1"/>
+              <a:t>should</a:t>
+            </a:r>
+            <a:r>
+              <a:rPr/>
+              <a:t> fall within 70–80 mm.</a:t>
+            </a:r>
+          </a:p>
+          <a:p>
+            <a:pPr lvl="0" indent="-342900" marL="342900">
+              <a:buAutoNum type="arabicPeriod"/>
+            </a:pPr>
+            <a:r>
+              <a:rPr b="1"/>
+              <a:t>Measurement:</a:t>
+            </a:r>
+            <a:r>
+              <a:rPr/>
+              <a:t> Check the data and confirm needles fall within this expected range.</a:t>
+            </a:r>
+          </a:p>
+          <a:p>
+            <a:pPr lvl="0" indent="0" marL="0">
+              <a:buNone/>
+            </a:pPr>
+            <a:r>
+              <a:rPr b="1"/>
+              <a:t>Conclusion (Deduction):</a:t>
+            </a:r>
+            <a:r>
+              <a:rPr/>
+              <a:t> </a:t>
+            </a:r>
+            <a:r>
+              <a:rPr i="1"/>
+              <a:t>“This tree belongs the species with a needle length range of 70–80 mm, we expect its needle lengths to fall in this range.”</a:t>
+            </a:r>
+          </a:p>
+          <a:p>
+            <a:pPr lvl="0" indent="0" marL="0">
+              <a:buNone/>
+            </a:pPr>
+            <a:r>
+              <a:rPr b="1"/>
+              <a:t>Stronger than induction</a:t>
+            </a:r>
+            <a:r>
+              <a:rPr/>
+              <a:t> because it’s based on a general rule—but if the assumption (length range) is incorrect, conclusion could still be wrong.</a:t>
             </a:r>
           </a:p>
         </p:txBody>

</xml_diff>